<commit_message>
intro prara ppt e v. ingles ppt
</commit_message>
<xml_diff>
--- a/Trabalho_Pratico/Apresentacao_v_Ingles.pptx
+++ b/Trabalho_Pratico/Apresentacao_v_Ingles.pptx
@@ -9981,25 +9981,22 @@
         </p:nvSpPr>
         <p:spPr/>
         <p:txBody>
-          <a:bodyPr/>
-          <a:lstStyle/>
-          <a:p>
-            <a:r>
-              <a:rPr lang="en-US" sz="1800" dirty="0">
-                <a:latin typeface="Times New Roman" panose="02020603050405020304" pitchFamily="18" charset="0"/>
-                <a:cs typeface="Times New Roman" panose="02020603050405020304" pitchFamily="18" charset="0"/>
-              </a:rPr>
-              <a:t>Application of Models and Performance Assessment  - </a:t>
-            </a:r>
-            <a:r>
-              <a:rPr lang="en-US" sz="1800" dirty="0">
-                <a:effectLst/>
+          <a:bodyPr>
+            <a:normAutofit/>
+          </a:bodyPr>
+          <a:lstStyle/>
+          <a:p>
+            <a:r>
+              <a:rPr lang="en-US" sz="3800" dirty="0">
                 <a:latin typeface="Times New Roman" panose="02020603050405020304" pitchFamily="18" charset="0"/>
                 <a:ea typeface="SimSun" panose="02010600030101010101" pitchFamily="2" charset="-122"/>
               </a:rPr>
-              <a:t>Evaluation</a:t>
-            </a:r>
-            <a:endParaRPr lang="pt-PT" dirty="0"/>
+              <a:t>Application of Models and Performance Assessment  Evaluation</a:t>
+            </a:r>
+            <a:endParaRPr lang="pt-PT" sz="3800" dirty="0">
+              <a:latin typeface="Times New Roman" panose="02020603050405020304" pitchFamily="18" charset="0"/>
+              <a:ea typeface="SimSun" panose="02010600030101010101" pitchFamily="2" charset="-122"/>
+            </a:endParaRPr>
           </a:p>
         </p:txBody>
       </p:sp>
@@ -10065,8 +10062,8 @@
         </p:blipFill>
         <p:spPr>
           <a:xfrm>
-            <a:off x="772160" y="1300479"/>
-            <a:ext cx="10748168" cy="4876483"/>
+            <a:off x="772160" y="1625423"/>
+            <a:ext cx="10031964" cy="4551539"/>
           </a:xfrm>
           <a:prstGeom prst="rect">
             <a:avLst/>

</xml_diff>